<commit_message>
added alum session presentation
</commit_message>
<xml_diff>
--- a/temp/AluminiSession/KnowledgeGraphs.pptx
+++ b/temp/AluminiSession/KnowledgeGraphs.pptx
@@ -702,14 +702,14 @@
   <p:clrMapOvr>
     <a:masterClrMapping/>
   </p:clrMapOvr>
-  <mc:AlternateContent xmlns:mc="http://schemas.openxmlformats.org/markup-compatibility/2006" xmlns:p159="http://schemas.microsoft.com/office/powerpoint/2015/09/main">
-    <mc:Choice Requires="p159">
-      <p:transition xmlns:p14="http://schemas.microsoft.com/office/powerpoint/2010/main" spd="slow" p14:dur="2000">
+  <mc:AlternateContent xmlns:mc="http://schemas.openxmlformats.org/markup-compatibility/2006">
+    <mc:Choice xmlns:p159="http://schemas.microsoft.com/office/powerpoint/2015/09/main" Requires="p159">
+      <p:transition xmlns:p14="http://schemas.microsoft.com/office/powerpoint/2010/main" p14:dur="300">
         <p159:morph option="byObject"/>
       </p:transition>
     </mc:Choice>
-    <mc:Fallback xmlns="">
-      <p:transition spd="slow">
+    <mc:Fallback>
+      <p:transition>
         <p:fade/>
       </p:transition>
     </mc:Fallback>
@@ -927,14 +927,14 @@
   <p:clrMapOvr>
     <a:masterClrMapping/>
   </p:clrMapOvr>
-  <mc:AlternateContent xmlns:mc="http://schemas.openxmlformats.org/markup-compatibility/2006" xmlns:p159="http://schemas.microsoft.com/office/powerpoint/2015/09/main">
-    <mc:Choice Requires="p159">
-      <p:transition xmlns:p14="http://schemas.microsoft.com/office/powerpoint/2010/main" spd="slow" p14:dur="2000">
+  <mc:AlternateContent xmlns:mc="http://schemas.openxmlformats.org/markup-compatibility/2006">
+    <mc:Choice xmlns:p159="http://schemas.microsoft.com/office/powerpoint/2015/09/main" Requires="p159">
+      <p:transition xmlns:p14="http://schemas.microsoft.com/office/powerpoint/2010/main" p14:dur="300">
         <p159:morph option="byObject"/>
       </p:transition>
     </mc:Choice>
-    <mc:Fallback xmlns="">
-      <p:transition spd="slow">
+    <mc:Fallback>
+      <p:transition>
         <p:fade/>
       </p:transition>
     </mc:Fallback>
@@ -1151,14 +1151,14 @@
   <p:clrMapOvr>
     <a:masterClrMapping/>
   </p:clrMapOvr>
-  <mc:AlternateContent xmlns:mc="http://schemas.openxmlformats.org/markup-compatibility/2006" xmlns:p159="http://schemas.microsoft.com/office/powerpoint/2015/09/main">
-    <mc:Choice Requires="p159">
-      <p:transition xmlns:p14="http://schemas.microsoft.com/office/powerpoint/2010/main" spd="slow" p14:dur="2000">
+  <mc:AlternateContent xmlns:mc="http://schemas.openxmlformats.org/markup-compatibility/2006">
+    <mc:Choice xmlns:p159="http://schemas.microsoft.com/office/powerpoint/2015/09/main" Requires="p159">
+      <p:transition xmlns:p14="http://schemas.microsoft.com/office/powerpoint/2010/main" p14:dur="300">
         <p159:morph option="byObject"/>
       </p:transition>
     </mc:Choice>
-    <mc:Fallback xmlns="">
-      <p:transition spd="slow">
+    <mc:Fallback>
+      <p:transition>
         <p:fade/>
       </p:transition>
     </mc:Fallback>
@@ -1364,14 +1364,14 @@
   <p:clrMapOvr>
     <a:masterClrMapping/>
   </p:clrMapOvr>
-  <mc:AlternateContent xmlns:mc="http://schemas.openxmlformats.org/markup-compatibility/2006" xmlns:p159="http://schemas.microsoft.com/office/powerpoint/2015/09/main">
-    <mc:Choice Requires="p159">
-      <p:transition xmlns:p14="http://schemas.microsoft.com/office/powerpoint/2010/main" spd="slow" p14:dur="2000">
+  <mc:AlternateContent xmlns:mc="http://schemas.openxmlformats.org/markup-compatibility/2006">
+    <mc:Choice xmlns:p159="http://schemas.microsoft.com/office/powerpoint/2015/09/main" Requires="p159">
+      <p:transition xmlns:p14="http://schemas.microsoft.com/office/powerpoint/2010/main" p14:dur="300">
         <p159:morph option="byObject"/>
       </p:transition>
     </mc:Choice>
-    <mc:Fallback xmlns="">
-      <p:transition spd="slow">
+    <mc:Fallback>
+      <p:transition>
         <p:fade/>
       </p:transition>
     </mc:Fallback>
@@ -1659,14 +1659,14 @@
   <p:clrMapOvr>
     <a:masterClrMapping/>
   </p:clrMapOvr>
-  <mc:AlternateContent xmlns:mc="http://schemas.openxmlformats.org/markup-compatibility/2006" xmlns:p159="http://schemas.microsoft.com/office/powerpoint/2015/09/main">
-    <mc:Choice Requires="p159">
-      <p:transition xmlns:p14="http://schemas.microsoft.com/office/powerpoint/2010/main" spd="slow" p14:dur="2000">
+  <mc:AlternateContent xmlns:mc="http://schemas.openxmlformats.org/markup-compatibility/2006">
+    <mc:Choice xmlns:p159="http://schemas.microsoft.com/office/powerpoint/2015/09/main" Requires="p159">
+      <p:transition xmlns:p14="http://schemas.microsoft.com/office/powerpoint/2010/main" p14:dur="300">
         <p159:morph option="byObject"/>
       </p:transition>
     </mc:Choice>
-    <mc:Fallback xmlns="">
-      <p:transition spd="slow">
+    <mc:Fallback>
+      <p:transition>
         <p:fade/>
       </p:transition>
     </mc:Fallback>
@@ -1983,14 +1983,14 @@
   <p:clrMapOvr>
     <a:masterClrMapping/>
   </p:clrMapOvr>
-  <mc:AlternateContent xmlns:mc="http://schemas.openxmlformats.org/markup-compatibility/2006" xmlns:p159="http://schemas.microsoft.com/office/powerpoint/2015/09/main">
-    <mc:Choice Requires="p159">
-      <p:transition xmlns:p14="http://schemas.microsoft.com/office/powerpoint/2010/main" spd="slow" p14:dur="2000">
+  <mc:AlternateContent xmlns:mc="http://schemas.openxmlformats.org/markup-compatibility/2006">
+    <mc:Choice xmlns:p159="http://schemas.microsoft.com/office/powerpoint/2015/09/main" Requires="p159">
+      <p:transition xmlns:p14="http://schemas.microsoft.com/office/powerpoint/2010/main" p14:dur="300">
         <p159:morph option="byObject"/>
       </p:transition>
     </mc:Choice>
-    <mc:Fallback xmlns="">
-      <p:transition spd="slow">
+    <mc:Fallback>
+      <p:transition>
         <p:fade/>
       </p:transition>
     </mc:Fallback>
@@ -2416,14 +2416,14 @@
   <p:clrMapOvr>
     <a:masterClrMapping/>
   </p:clrMapOvr>
-  <mc:AlternateContent xmlns:mc="http://schemas.openxmlformats.org/markup-compatibility/2006" xmlns:p159="http://schemas.microsoft.com/office/powerpoint/2015/09/main">
-    <mc:Choice Requires="p159">
-      <p:transition xmlns:p14="http://schemas.microsoft.com/office/powerpoint/2010/main" spd="slow" p14:dur="2000">
+  <mc:AlternateContent xmlns:mc="http://schemas.openxmlformats.org/markup-compatibility/2006">
+    <mc:Choice xmlns:p159="http://schemas.microsoft.com/office/powerpoint/2015/09/main" Requires="p159">
+      <p:transition xmlns:p14="http://schemas.microsoft.com/office/powerpoint/2010/main" p14:dur="300">
         <p159:morph option="byObject"/>
       </p:transition>
     </mc:Choice>
-    <mc:Fallback xmlns="">
-      <p:transition spd="slow">
+    <mc:Fallback>
+      <p:transition>
         <p:fade/>
       </p:transition>
     </mc:Fallback>
@@ -2578,14 +2578,14 @@
   <p:clrMapOvr>
     <a:masterClrMapping/>
   </p:clrMapOvr>
-  <mc:AlternateContent xmlns:mc="http://schemas.openxmlformats.org/markup-compatibility/2006" xmlns:p159="http://schemas.microsoft.com/office/powerpoint/2015/09/main">
-    <mc:Choice Requires="p159">
-      <p:transition xmlns:p14="http://schemas.microsoft.com/office/powerpoint/2010/main" spd="slow" p14:dur="2000">
+  <mc:AlternateContent xmlns:mc="http://schemas.openxmlformats.org/markup-compatibility/2006">
+    <mc:Choice xmlns:p159="http://schemas.microsoft.com/office/powerpoint/2015/09/main" Requires="p159">
+      <p:transition xmlns:p14="http://schemas.microsoft.com/office/powerpoint/2010/main" p14:dur="300">
         <p159:morph option="byObject"/>
       </p:transition>
     </mc:Choice>
-    <mc:Fallback xmlns="">
-      <p:transition spd="slow">
+    <mc:Fallback>
+      <p:transition>
         <p:fade/>
       </p:transition>
     </mc:Fallback>
@@ -2706,14 +2706,14 @@
   <p:clrMapOvr>
     <a:masterClrMapping/>
   </p:clrMapOvr>
-  <mc:AlternateContent xmlns:mc="http://schemas.openxmlformats.org/markup-compatibility/2006" xmlns:p159="http://schemas.microsoft.com/office/powerpoint/2015/09/main">
-    <mc:Choice Requires="p159">
-      <p:transition xmlns:p14="http://schemas.microsoft.com/office/powerpoint/2010/main" spd="slow" p14:dur="2000">
+  <mc:AlternateContent xmlns:mc="http://schemas.openxmlformats.org/markup-compatibility/2006">
+    <mc:Choice xmlns:p159="http://schemas.microsoft.com/office/powerpoint/2015/09/main" Requires="p159">
+      <p:transition xmlns:p14="http://schemas.microsoft.com/office/powerpoint/2010/main" p14:dur="300">
         <p159:morph option="byObject"/>
       </p:transition>
     </mc:Choice>
-    <mc:Fallback xmlns="">
-      <p:transition spd="slow">
+    <mc:Fallback>
+      <p:transition>
         <p:fade/>
       </p:transition>
     </mc:Fallback>
@@ -3034,14 +3034,14 @@
   <p:clrMapOvr>
     <a:masterClrMapping/>
   </p:clrMapOvr>
-  <mc:AlternateContent xmlns:mc="http://schemas.openxmlformats.org/markup-compatibility/2006" xmlns:p159="http://schemas.microsoft.com/office/powerpoint/2015/09/main">
-    <mc:Choice Requires="p159">
-      <p:transition xmlns:p14="http://schemas.microsoft.com/office/powerpoint/2010/main" spd="slow" p14:dur="2000">
+  <mc:AlternateContent xmlns:mc="http://schemas.openxmlformats.org/markup-compatibility/2006">
+    <mc:Choice xmlns:p159="http://schemas.microsoft.com/office/powerpoint/2015/09/main" Requires="p159">
+      <p:transition xmlns:p14="http://schemas.microsoft.com/office/powerpoint/2010/main" p14:dur="300">
         <p159:morph option="byObject"/>
       </p:transition>
     </mc:Choice>
-    <mc:Fallback xmlns="">
-      <p:transition spd="slow">
+    <mc:Fallback>
+      <p:transition>
         <p:fade/>
       </p:transition>
     </mc:Fallback>
@@ -3346,14 +3346,14 @@
   <p:clrMapOvr>
     <a:masterClrMapping/>
   </p:clrMapOvr>
-  <mc:AlternateContent xmlns:mc="http://schemas.openxmlformats.org/markup-compatibility/2006" xmlns:p159="http://schemas.microsoft.com/office/powerpoint/2015/09/main">
-    <mc:Choice Requires="p159">
-      <p:transition xmlns:p14="http://schemas.microsoft.com/office/powerpoint/2010/main" spd="slow" p14:dur="2000">
+  <mc:AlternateContent xmlns:mc="http://schemas.openxmlformats.org/markup-compatibility/2006">
+    <mc:Choice xmlns:p159="http://schemas.microsoft.com/office/powerpoint/2015/09/main" Requires="p159">
+      <p:transition xmlns:p14="http://schemas.microsoft.com/office/powerpoint/2010/main" p14:dur="300">
         <p159:morph option="byObject"/>
       </p:transition>
     </mc:Choice>
-    <mc:Fallback xmlns="">
-      <p:transition spd="slow">
+    <mc:Fallback>
+      <p:transition>
         <p:fade/>
       </p:transition>
     </mc:Fallback>
@@ -3645,14 +3645,14 @@
     <p:sldLayoutId id="2147483662" r:id="rId10"/>
     <p:sldLayoutId id="2147483661" r:id="rId11"/>
   </p:sldLayoutIdLst>
-  <mc:AlternateContent xmlns:mc="http://schemas.openxmlformats.org/markup-compatibility/2006" xmlns:p159="http://schemas.microsoft.com/office/powerpoint/2015/09/main">
-    <mc:Choice Requires="p159">
-      <p:transition xmlns:p14="http://schemas.microsoft.com/office/powerpoint/2010/main" spd="slow" p14:dur="2000">
+  <mc:AlternateContent xmlns:mc="http://schemas.openxmlformats.org/markup-compatibility/2006">
+    <mc:Choice xmlns:p159="http://schemas.microsoft.com/office/powerpoint/2015/09/main" Requires="p159">
+      <p:transition xmlns:p14="http://schemas.microsoft.com/office/powerpoint/2010/main" p14:dur="300">
         <p159:morph option="byObject"/>
       </p:transition>
     </mc:Choice>
-    <mc:Fallback xmlns="">
-      <p:transition spd="slow">
+    <mc:Fallback>
+      <p:transition>
         <p:fade/>
       </p:transition>
     </mc:Fallback>
@@ -4070,14 +4070,14 @@
   <p:clrMapOvr>
     <a:masterClrMapping/>
   </p:clrMapOvr>
-  <mc:AlternateContent xmlns:mc="http://schemas.openxmlformats.org/markup-compatibility/2006" xmlns:p159="http://schemas.microsoft.com/office/powerpoint/2015/09/main">
-    <mc:Choice Requires="p159">
-      <p:transition xmlns:p14="http://schemas.microsoft.com/office/powerpoint/2010/main" spd="slow" p14:dur="2000">
+  <mc:AlternateContent xmlns:mc="http://schemas.openxmlformats.org/markup-compatibility/2006">
+    <mc:Choice xmlns:p159="http://schemas.microsoft.com/office/powerpoint/2015/09/main" Requires="p159">
+      <p:transition xmlns:p14="http://schemas.microsoft.com/office/powerpoint/2010/main" p14:dur="300">
         <p159:morph option="byObject"/>
       </p:transition>
     </mc:Choice>
-    <mc:Fallback xmlns="">
-      <p:transition spd="slow">
+    <mc:Fallback>
+      <p:transition>
         <p:fade/>
       </p:transition>
     </mc:Fallback>
@@ -4094,9 +4094,6 @@
                     <p:cTn id="3" fill="hold">
                       <p:stCondLst>
                         <p:cond delay="indefinite"/>
-                        <p:cond evt="onBegin" delay="0">
-                          <p:tn val="2"/>
-                        </p:cond>
                       </p:stCondLst>
                       <p:childTnLst>
                         <p:par>
@@ -4106,9 +4103,9 @@
                             </p:stCondLst>
                             <p:childTnLst>
                               <p:par>
-                                <p:cTn id="5" presetID="10" presetClass="entr" presetSubtype="0" fill="hold" grpId="0" nodeType="withEffect">
+                                <p:cTn id="5" presetID="10" presetClass="entr" presetSubtype="0" fill="hold" grpId="0" nodeType="clickEffect">
                                   <p:stCondLst>
-                                    <p:cond delay="1000"/>
+                                    <p:cond delay="0"/>
                                   </p:stCondLst>
                                   <p:iterate type="lt">
                                     <p:tmPct val="10000"/>
@@ -4134,7 +4131,7 @@
                                     </p:set>
                                     <p:animEffect transition="in" filter="fade">
                                       <p:cBhvr>
-                                        <p:cTn id="7" dur="400"/>
+                                        <p:cTn id="7" dur="300"/>
                                         <p:tgtEl>
                                           <p:spTgt spid="2"/>
                                         </p:tgtEl>
@@ -4366,14 +4363,14 @@
   <p:clrMapOvr>
     <a:masterClrMapping/>
   </p:clrMapOvr>
-  <mc:AlternateContent xmlns:mc="http://schemas.openxmlformats.org/markup-compatibility/2006" xmlns:p159="http://schemas.microsoft.com/office/powerpoint/2015/09/main">
-    <mc:Choice Requires="p159">
-      <p:transition xmlns:p14="http://schemas.microsoft.com/office/powerpoint/2010/main" spd="slow" p14:dur="2000">
+  <mc:AlternateContent xmlns:mc="http://schemas.openxmlformats.org/markup-compatibility/2006">
+    <mc:Choice xmlns:p159="http://schemas.microsoft.com/office/powerpoint/2015/09/main" Requires="p159">
+      <p:transition xmlns:p14="http://schemas.microsoft.com/office/powerpoint/2010/main" p14:dur="300">
         <p159:morph option="byObject"/>
       </p:transition>
     </mc:Choice>
-    <mc:Fallback xmlns="">
-      <p:transition spd="slow">
+    <mc:Fallback>
+      <p:transition>
         <p:fade/>
       </p:transition>
     </mc:Fallback>
@@ -4769,18 +4766,93 @@
   <p:clrMapOvr>
     <a:masterClrMapping/>
   </p:clrMapOvr>
-  <mc:AlternateContent xmlns:mc="http://schemas.openxmlformats.org/markup-compatibility/2006" xmlns:p159="http://schemas.microsoft.com/office/powerpoint/2015/09/main">
-    <mc:Choice Requires="p159">
-      <p:transition xmlns:p14="http://schemas.microsoft.com/office/powerpoint/2010/main" spd="slow" p14:dur="2000">
+  <mc:AlternateContent xmlns:mc="http://schemas.openxmlformats.org/markup-compatibility/2006">
+    <mc:Choice xmlns:p159="http://schemas.microsoft.com/office/powerpoint/2015/09/main" Requires="p159">
+      <p:transition xmlns:p14="http://schemas.microsoft.com/office/powerpoint/2010/main" p14:dur="300">
         <p159:morph option="byObject"/>
       </p:transition>
     </mc:Choice>
-    <mc:Fallback xmlns="">
-      <p:transition spd="slow">
+    <mc:Fallback>
+      <p:transition>
         <p:fade/>
       </p:transition>
     </mc:Fallback>
   </mc:AlternateContent>
+  <p:timing>
+    <p:tnLst>
+      <p:par>
+        <p:cTn id="1" dur="indefinite" restart="never" nodeType="tmRoot">
+          <p:childTnLst>
+            <p:seq concurrent="1" nextAc="seek">
+              <p:cTn id="2" dur="indefinite" nodeType="mainSeq">
+                <p:childTnLst>
+                  <p:par>
+                    <p:cTn id="3" fill="hold">
+                      <p:stCondLst>
+                        <p:cond delay="indefinite"/>
+                      </p:stCondLst>
+                      <p:childTnLst>
+                        <p:par>
+                          <p:cTn id="4" fill="hold">
+                            <p:stCondLst>
+                              <p:cond delay="0"/>
+                            </p:stCondLst>
+                            <p:childTnLst>
+                              <p:par>
+                                <p:cTn id="5" presetID="1" presetClass="entr" presetSubtype="0" fill="hold" nodeType="clickEffect">
+                                  <p:stCondLst>
+                                    <p:cond delay="0"/>
+                                  </p:stCondLst>
+                                  <p:childTnLst>
+                                    <p:set>
+                                      <p:cBhvr>
+                                        <p:cTn id="6" dur="1" fill="hold">
+                                          <p:stCondLst>
+                                            <p:cond delay="9"/>
+                                          </p:stCondLst>
+                                        </p:cTn>
+                                        <p:tgtEl>
+                                          <p:spTgt spid="2050"/>
+                                        </p:tgtEl>
+                                        <p:attrNameLst>
+                                          <p:attrName>style.visibility</p:attrName>
+                                        </p:attrNameLst>
+                                      </p:cBhvr>
+                                      <p:to>
+                                        <p:strVal val="visible"/>
+                                      </p:to>
+                                    </p:set>
+                                  </p:childTnLst>
+                                </p:cTn>
+                              </p:par>
+                            </p:childTnLst>
+                          </p:cTn>
+                        </p:par>
+                      </p:childTnLst>
+                    </p:cTn>
+                  </p:par>
+                </p:childTnLst>
+              </p:cTn>
+              <p:prevCondLst>
+                <p:cond evt="onPrev" delay="0">
+                  <p:tgtEl>
+                    <p:sldTgt/>
+                  </p:tgtEl>
+                </p:cond>
+              </p:prevCondLst>
+              <p:nextCondLst>
+                <p:cond evt="onNext" delay="0">
+                  <p:tgtEl>
+                    <p:sldTgt/>
+                  </p:tgtEl>
+                </p:cond>
+              </p:nextCondLst>
+            </p:seq>
+          </p:childTnLst>
+        </p:cTn>
+      </p:par>
+    </p:tnLst>
+  </p:timing>
 </p:sld>
 </file>
 
@@ -4973,14 +5045,14 @@
   <p:clrMapOvr>
     <a:masterClrMapping/>
   </p:clrMapOvr>
-  <mc:AlternateContent xmlns:mc="http://schemas.openxmlformats.org/markup-compatibility/2006" xmlns:p159="http://schemas.microsoft.com/office/powerpoint/2015/09/main">
-    <mc:Choice Requires="p159">
-      <p:transition xmlns:p14="http://schemas.microsoft.com/office/powerpoint/2010/main" spd="slow" p14:dur="2000">
+  <mc:AlternateContent xmlns:mc="http://schemas.openxmlformats.org/markup-compatibility/2006">
+    <mc:Choice xmlns:p159="http://schemas.microsoft.com/office/powerpoint/2015/09/main" Requires="p159">
+      <p:transition xmlns:p14="http://schemas.microsoft.com/office/powerpoint/2010/main" p14:dur="300">
         <p159:morph option="byObject"/>
       </p:transition>
     </mc:Choice>
-    <mc:Fallback xmlns="">
-      <p:transition spd="slow">
+    <mc:Fallback>
+      <p:transition>
         <p:fade/>
       </p:transition>
     </mc:Fallback>
@@ -5242,14 +5314,14 @@
   <p:clrMapOvr>
     <a:masterClrMapping/>
   </p:clrMapOvr>
-  <mc:AlternateContent xmlns:mc="http://schemas.openxmlformats.org/markup-compatibility/2006" xmlns:p159="http://schemas.microsoft.com/office/powerpoint/2015/09/main">
-    <mc:Choice Requires="p159">
-      <p:transition xmlns:p14="http://schemas.microsoft.com/office/powerpoint/2010/main" spd="slow" p14:dur="2000">
+  <mc:AlternateContent xmlns:mc="http://schemas.openxmlformats.org/markup-compatibility/2006">
+    <mc:Choice xmlns:p159="http://schemas.microsoft.com/office/powerpoint/2015/09/main" Requires="p159">
+      <p:transition xmlns:p14="http://schemas.microsoft.com/office/powerpoint/2010/main" p14:dur="300">
         <p159:morph option="byObject"/>
       </p:transition>
     </mc:Choice>
-    <mc:Fallback xmlns="">
-      <p:transition spd="slow">
+    <mc:Fallback>
+      <p:transition>
         <p:fade/>
       </p:transition>
     </mc:Fallback>
@@ -5474,14 +5546,14 @@
   <p:clrMapOvr>
     <a:masterClrMapping/>
   </p:clrMapOvr>
-  <mc:AlternateContent xmlns:mc="http://schemas.openxmlformats.org/markup-compatibility/2006" xmlns:p159="http://schemas.microsoft.com/office/powerpoint/2015/09/main">
-    <mc:Choice Requires="p159">
-      <p:transition xmlns:p14="http://schemas.microsoft.com/office/powerpoint/2010/main" spd="slow" p14:dur="2000">
+  <mc:AlternateContent xmlns:mc="http://schemas.openxmlformats.org/markup-compatibility/2006">
+    <mc:Choice xmlns:p159="http://schemas.microsoft.com/office/powerpoint/2015/09/main" Requires="p159">
+      <p:transition xmlns:p14="http://schemas.microsoft.com/office/powerpoint/2010/main" p14:dur="300">
         <p159:morph option="byObject"/>
       </p:transition>
     </mc:Choice>
-    <mc:Fallback xmlns="">
-      <p:transition spd="slow">
+    <mc:Fallback>
+      <p:transition>
         <p:fade/>
       </p:transition>
     </mc:Fallback>
@@ -5676,14 +5748,14 @@
   <p:clrMapOvr>
     <a:masterClrMapping/>
   </p:clrMapOvr>
-  <mc:AlternateContent xmlns:mc="http://schemas.openxmlformats.org/markup-compatibility/2006" xmlns:p159="http://schemas.microsoft.com/office/powerpoint/2015/09/main">
-    <mc:Choice Requires="p159">
-      <p:transition xmlns:p14="http://schemas.microsoft.com/office/powerpoint/2010/main" spd="slow" p14:dur="2000">
+  <mc:AlternateContent xmlns:mc="http://schemas.openxmlformats.org/markup-compatibility/2006">
+    <mc:Choice xmlns:p159="http://schemas.microsoft.com/office/powerpoint/2015/09/main" Requires="p159">
+      <p:transition xmlns:p14="http://schemas.microsoft.com/office/powerpoint/2010/main" p14:dur="300">
         <p159:morph option="byObject"/>
       </p:transition>
     </mc:Choice>
-    <mc:Fallback xmlns="">
-      <p:transition spd="slow">
+    <mc:Fallback>
+      <p:transition>
         <p:fade/>
       </p:transition>
     </mc:Fallback>
@@ -6007,14 +6079,14 @@
   <p:clrMapOvr>
     <a:masterClrMapping/>
   </p:clrMapOvr>
-  <mc:AlternateContent xmlns:mc="http://schemas.openxmlformats.org/markup-compatibility/2006" xmlns:p159="http://schemas.microsoft.com/office/powerpoint/2015/09/main">
-    <mc:Choice Requires="p159">
-      <p:transition xmlns:p14="http://schemas.microsoft.com/office/powerpoint/2010/main" spd="slow" p14:dur="2000">
+  <mc:AlternateContent xmlns:mc="http://schemas.openxmlformats.org/markup-compatibility/2006">
+    <mc:Choice xmlns:p159="http://schemas.microsoft.com/office/powerpoint/2015/09/main" Requires="p159">
+      <p:transition xmlns:p14="http://schemas.microsoft.com/office/powerpoint/2010/main" p14:dur="300">
         <p159:morph option="byObject"/>
       </p:transition>
     </mc:Choice>
-    <mc:Fallback xmlns="">
-      <p:transition spd="slow">
+    <mc:Fallback>
+      <p:transition>
         <p:fade/>
       </p:transition>
     </mc:Fallback>
@@ -6297,14 +6369,14 @@
   <p:clrMapOvr>
     <a:masterClrMapping/>
   </p:clrMapOvr>
-  <mc:AlternateContent xmlns:mc="http://schemas.openxmlformats.org/markup-compatibility/2006" xmlns:p159="http://schemas.microsoft.com/office/powerpoint/2015/09/main">
-    <mc:Choice Requires="p159">
-      <p:transition xmlns:p14="http://schemas.microsoft.com/office/powerpoint/2010/main" spd="slow" p14:dur="2000">
+  <mc:AlternateContent xmlns:mc="http://schemas.openxmlformats.org/markup-compatibility/2006">
+    <mc:Choice xmlns:p159="http://schemas.microsoft.com/office/powerpoint/2015/09/main" Requires="p159">
+      <p:transition xmlns:p14="http://schemas.microsoft.com/office/powerpoint/2010/main" p14:dur="300">
         <p159:morph option="byObject"/>
       </p:transition>
     </mc:Choice>
-    <mc:Fallback xmlns="">
-      <p:transition spd="slow">
+    <mc:Fallback>
+      <p:transition>
         <p:fade/>
       </p:transition>
     </mc:Fallback>
@@ -6755,18 +6827,260 @@
   <p:clrMapOvr>
     <a:masterClrMapping/>
   </p:clrMapOvr>
-  <mc:AlternateContent xmlns:mc="http://schemas.openxmlformats.org/markup-compatibility/2006" xmlns:p159="http://schemas.microsoft.com/office/powerpoint/2015/09/main">
-    <mc:Choice Requires="p159">
-      <p:transition xmlns:p14="http://schemas.microsoft.com/office/powerpoint/2010/main" spd="slow" p14:dur="2000">
+  <mc:AlternateContent xmlns:mc="http://schemas.openxmlformats.org/markup-compatibility/2006">
+    <mc:Choice xmlns:p159="http://schemas.microsoft.com/office/powerpoint/2015/09/main" Requires="p159">
+      <p:transition xmlns:p14="http://schemas.microsoft.com/office/powerpoint/2010/main" p14:dur="300">
         <p159:morph option="byObject"/>
       </p:transition>
     </mc:Choice>
-    <mc:Fallback xmlns="">
-      <p:transition spd="slow">
+    <mc:Fallback>
+      <p:transition>
         <p:fade/>
       </p:transition>
     </mc:Fallback>
   </mc:AlternateContent>
+  <p:timing>
+    <p:tnLst>
+      <p:par>
+        <p:cTn id="1" dur="indefinite" restart="never" nodeType="tmRoot">
+          <p:childTnLst>
+            <p:seq concurrent="1" nextAc="seek">
+              <p:cTn id="2" dur="indefinite" nodeType="mainSeq">
+                <p:childTnLst>
+                  <p:par>
+                    <p:cTn id="3" fill="hold">
+                      <p:stCondLst>
+                        <p:cond delay="indefinite"/>
+                      </p:stCondLst>
+                      <p:childTnLst>
+                        <p:par>
+                          <p:cTn id="4" fill="hold">
+                            <p:stCondLst>
+                              <p:cond delay="0"/>
+                            </p:stCondLst>
+                            <p:childTnLst>
+                              <p:par>
+                                <p:cTn id="5" presetID="1" presetClass="entr" presetSubtype="0" fill="hold" grpId="0" nodeType="clickEffect">
+                                  <p:stCondLst>
+                                    <p:cond delay="0"/>
+                                  </p:stCondLst>
+                                  <p:childTnLst>
+                                    <p:set>
+                                      <p:cBhvr>
+                                        <p:cTn id="6" dur="1" fill="hold">
+                                          <p:stCondLst>
+                                            <p:cond delay="9"/>
+                                          </p:stCondLst>
+                                        </p:cTn>
+                                        <p:tgtEl>
+                                          <p:spTgt spid="3"/>
+                                        </p:tgtEl>
+                                        <p:attrNameLst>
+                                          <p:attrName>style.visibility</p:attrName>
+                                        </p:attrNameLst>
+                                      </p:cBhvr>
+                                      <p:to>
+                                        <p:strVal val="visible"/>
+                                      </p:to>
+                                    </p:set>
+                                  </p:childTnLst>
+                                </p:cTn>
+                              </p:par>
+                            </p:childTnLst>
+                          </p:cTn>
+                        </p:par>
+                      </p:childTnLst>
+                    </p:cTn>
+                  </p:par>
+                  <p:par>
+                    <p:cTn id="7" fill="hold">
+                      <p:stCondLst>
+                        <p:cond delay="indefinite"/>
+                      </p:stCondLst>
+                      <p:childTnLst>
+                        <p:par>
+                          <p:cTn id="8" fill="hold">
+                            <p:stCondLst>
+                              <p:cond delay="0"/>
+                            </p:stCondLst>
+                            <p:childTnLst>
+                              <p:par>
+                                <p:cTn id="9" presetID="1" presetClass="entr" presetSubtype="0" fill="hold" nodeType="clickEffect">
+                                  <p:stCondLst>
+                                    <p:cond delay="0"/>
+                                  </p:stCondLst>
+                                  <p:childTnLst>
+                                    <p:set>
+                                      <p:cBhvr>
+                                        <p:cTn id="10" dur="1" fill="hold">
+                                          <p:stCondLst>
+                                            <p:cond delay="9"/>
+                                          </p:stCondLst>
+                                        </p:cTn>
+                                        <p:tgtEl>
+                                          <p:spTgt spid="12294"/>
+                                        </p:tgtEl>
+                                        <p:attrNameLst>
+                                          <p:attrName>style.visibility</p:attrName>
+                                        </p:attrNameLst>
+                                      </p:cBhvr>
+                                      <p:to>
+                                        <p:strVal val="visible"/>
+                                      </p:to>
+                                    </p:set>
+                                  </p:childTnLst>
+                                </p:cTn>
+                              </p:par>
+                              <p:par>
+                                <p:cTn id="11" presetID="1" presetClass="entr" presetSubtype="0" fill="hold" grpId="0" nodeType="withEffect">
+                                  <p:stCondLst>
+                                    <p:cond delay="0"/>
+                                  </p:stCondLst>
+                                  <p:childTnLst>
+                                    <p:set>
+                                      <p:cBhvr>
+                                        <p:cTn id="12" dur="1" fill="hold">
+                                          <p:stCondLst>
+                                            <p:cond delay="0"/>
+                                          </p:stCondLst>
+                                        </p:cTn>
+                                        <p:tgtEl>
+                                          <p:spTgt spid="10"/>
+                                        </p:tgtEl>
+                                        <p:attrNameLst>
+                                          <p:attrName>style.visibility</p:attrName>
+                                        </p:attrNameLst>
+                                      </p:cBhvr>
+                                      <p:to>
+                                        <p:strVal val="visible"/>
+                                      </p:to>
+                                    </p:set>
+                                  </p:childTnLst>
+                                </p:cTn>
+                              </p:par>
+                            </p:childTnLst>
+                          </p:cTn>
+                        </p:par>
+                      </p:childTnLst>
+                    </p:cTn>
+                  </p:par>
+                  <p:par>
+                    <p:cTn id="13" fill="hold">
+                      <p:stCondLst>
+                        <p:cond delay="indefinite"/>
+                      </p:stCondLst>
+                      <p:childTnLst>
+                        <p:par>
+                          <p:cTn id="14" fill="hold">
+                            <p:stCondLst>
+                              <p:cond delay="0"/>
+                            </p:stCondLst>
+                            <p:childTnLst>
+                              <p:par>
+                                <p:cTn id="15" presetID="1" presetClass="entr" presetSubtype="0" fill="hold" grpId="0" nodeType="clickEffect">
+                                  <p:stCondLst>
+                                    <p:cond delay="0"/>
+                                  </p:stCondLst>
+                                  <p:childTnLst>
+                                    <p:set>
+                                      <p:cBhvr>
+                                        <p:cTn id="16" dur="1" fill="hold">
+                                          <p:stCondLst>
+                                            <p:cond delay="9"/>
+                                          </p:stCondLst>
+                                        </p:cTn>
+                                        <p:tgtEl>
+                                          <p:spTgt spid="8"/>
+                                        </p:tgtEl>
+                                        <p:attrNameLst>
+                                          <p:attrName>style.visibility</p:attrName>
+                                        </p:attrNameLst>
+                                      </p:cBhvr>
+                                      <p:to>
+                                        <p:strVal val="visible"/>
+                                      </p:to>
+                                    </p:set>
+                                  </p:childTnLst>
+                                </p:cTn>
+                              </p:par>
+                            </p:childTnLst>
+                          </p:cTn>
+                        </p:par>
+                      </p:childTnLst>
+                    </p:cTn>
+                  </p:par>
+                  <p:par>
+                    <p:cTn id="17" fill="hold">
+                      <p:stCondLst>
+                        <p:cond delay="indefinite"/>
+                      </p:stCondLst>
+                      <p:childTnLst>
+                        <p:par>
+                          <p:cTn id="18" fill="hold">
+                            <p:stCondLst>
+                              <p:cond delay="0"/>
+                            </p:stCondLst>
+                            <p:childTnLst>
+                              <p:par>
+                                <p:cTn id="19" presetID="1" presetClass="entr" presetSubtype="0" fill="hold" nodeType="clickEffect">
+                                  <p:stCondLst>
+                                    <p:cond delay="0"/>
+                                  </p:stCondLst>
+                                  <p:childTnLst>
+                                    <p:set>
+                                      <p:cBhvr>
+                                        <p:cTn id="20" dur="1" fill="hold">
+                                          <p:stCondLst>
+                                            <p:cond delay="9"/>
+                                          </p:stCondLst>
+                                        </p:cTn>
+                                        <p:tgtEl>
+                                          <p:spTgt spid="12290"/>
+                                        </p:tgtEl>
+                                        <p:attrNameLst>
+                                          <p:attrName>style.visibility</p:attrName>
+                                        </p:attrNameLst>
+                                      </p:cBhvr>
+                                      <p:to>
+                                        <p:strVal val="visible"/>
+                                      </p:to>
+                                    </p:set>
+                                  </p:childTnLst>
+                                </p:cTn>
+                              </p:par>
+                            </p:childTnLst>
+                          </p:cTn>
+                        </p:par>
+                      </p:childTnLst>
+                    </p:cTn>
+                  </p:par>
+                </p:childTnLst>
+              </p:cTn>
+              <p:prevCondLst>
+                <p:cond evt="onPrev" delay="0">
+                  <p:tgtEl>
+                    <p:sldTgt/>
+                  </p:tgtEl>
+                </p:cond>
+              </p:prevCondLst>
+              <p:nextCondLst>
+                <p:cond evt="onNext" delay="0">
+                  <p:tgtEl>
+                    <p:sldTgt/>
+                  </p:tgtEl>
+                </p:cond>
+              </p:nextCondLst>
+            </p:seq>
+          </p:childTnLst>
+        </p:cTn>
+      </p:par>
+    </p:tnLst>
+    <p:bldLst>
+      <p:bldP spid="3" grpId="0"/>
+      <p:bldP spid="8" grpId="0"/>
+      <p:bldP spid="10" grpId="0"/>
+    </p:bldLst>
+  </p:timing>
 </p:sld>
 </file>
 
@@ -7011,14 +7325,14 @@
   <p:clrMapOvr>
     <a:masterClrMapping/>
   </p:clrMapOvr>
-  <mc:AlternateContent xmlns:mc="http://schemas.openxmlformats.org/markup-compatibility/2006" xmlns:p159="http://schemas.microsoft.com/office/powerpoint/2015/09/main">
-    <mc:Choice Requires="p159">
-      <p:transition xmlns:p14="http://schemas.microsoft.com/office/powerpoint/2010/main" spd="slow" p14:dur="2000">
+  <mc:AlternateContent xmlns:mc="http://schemas.openxmlformats.org/markup-compatibility/2006">
+    <mc:Choice xmlns:p159="http://schemas.microsoft.com/office/powerpoint/2015/09/main" Requires="p159">
+      <p:transition xmlns:p14="http://schemas.microsoft.com/office/powerpoint/2010/main" p14:dur="300">
         <p159:morph option="byObject"/>
       </p:transition>
     </mc:Choice>
-    <mc:Fallback xmlns="">
-      <p:transition spd="slow">
+    <mc:Fallback>
+      <p:transition>
         <p:fade/>
       </p:transition>
     </mc:Fallback>
@@ -7346,14 +7660,14 @@
   <p:clrMapOvr>
     <a:masterClrMapping/>
   </p:clrMapOvr>
-  <mc:AlternateContent xmlns:mc="http://schemas.openxmlformats.org/markup-compatibility/2006" xmlns:p159="http://schemas.microsoft.com/office/powerpoint/2015/09/main">
-    <mc:Choice Requires="p159">
-      <p:transition xmlns:p14="http://schemas.microsoft.com/office/powerpoint/2010/main" spd="slow" p14:dur="2000">
+  <mc:AlternateContent xmlns:mc="http://schemas.openxmlformats.org/markup-compatibility/2006">
+    <mc:Choice xmlns:p159="http://schemas.microsoft.com/office/powerpoint/2015/09/main" Requires="p159">
+      <p:transition xmlns:p14="http://schemas.microsoft.com/office/powerpoint/2010/main" p14:dur="300">
         <p159:morph option="byObject"/>
       </p:transition>
     </mc:Choice>
-    <mc:Fallback xmlns="">
-      <p:transition spd="slow">
+    <mc:Fallback>
+      <p:transition>
         <p:fade/>
       </p:transition>
     </mc:Fallback>

</xml_diff>